<commit_message>
Grelha dificuldades dispositivos, ppt falta tasks
</commit_message>
<xml_diff>
--- a/Aula 03/G10 - Apresentação - Lab03.pptx
+++ b/Aula 03/G10 - Apresentação - Lab03.pptx
@@ -5,7 +5,7 @@
     <p:sldMasterId id="2147483660" r:id="rId1"/>
   </p:sldMasterIdLst>
   <p:notesMasterIdLst>
-    <p:notesMasterId r:id="rId15"/>
+    <p:notesMasterId r:id="rId17"/>
   </p:notesMasterIdLst>
   <p:sldIdLst>
     <p:sldId id="256" r:id="rId2"/>
@@ -17,10 +17,12 @@
     <p:sldId id="278" r:id="rId8"/>
     <p:sldId id="271" r:id="rId9"/>
     <p:sldId id="274" r:id="rId10"/>
-    <p:sldId id="272" r:id="rId11"/>
-    <p:sldId id="277" r:id="rId12"/>
-    <p:sldId id="266" r:id="rId13"/>
-    <p:sldId id="259" r:id="rId14"/>
+    <p:sldId id="279" r:id="rId11"/>
+    <p:sldId id="272" r:id="rId12"/>
+    <p:sldId id="277" r:id="rId13"/>
+    <p:sldId id="280" r:id="rId14"/>
+    <p:sldId id="266" r:id="rId15"/>
+    <p:sldId id="259" r:id="rId16"/>
   </p:sldIdLst>
   <p:sldSz cx="9144000" cy="6858000" type="screen4x3"/>
   <p:notesSz cx="6858000" cy="9144000"/>
@@ -121,7 +123,7 @@
   </p:defaultTextStyle>
   <p:extLst>
     <p:ext uri="{EFAFB233-063F-42B5-8137-9DF3F51BA10A}">
-      <p15:sldGuideLst xmlns="" xmlns:p15="http://schemas.microsoft.com/office/powerpoint/2012/main">
+      <p15:sldGuideLst xmlns:p15="http://schemas.microsoft.com/office/powerpoint/2012/main" xmlns="">
         <p15:guide id="1" orient="horz" pos="2160">
           <p15:clr>
             <a:srgbClr val="A4A3A4"/>
@@ -220,7 +222,7 @@
           <a:p>
             <a:fld id="{A0410F9C-3A27-C84F-B27D-9342140F08DB}" type="datetimeFigureOut">
               <a:rPr lang="pt-PT" smtClean="0"/>
-              <a:t>11-10-2015</a:t>
+              <a:t>14-10-2015</a:t>
             </a:fld>
             <a:endParaRPr lang="pt-PT"/>
           </a:p>
@@ -553,7 +555,7 @@
           <a:p>
             <a:fld id="{9886E254-ACB4-B240-BB93-3D6DFACA42BA}" type="slidenum">
               <a:rPr lang="pt-PT" smtClean="0"/>
-              <a:t>12</a:t>
+              <a:t>14</a:t>
             </a:fld>
             <a:endParaRPr lang="pt-PT"/>
           </a:p>
@@ -773,7 +775,7 @@
           <a:p>
             <a:fld id="{D728701E-CAF4-4159-9B3E-41C86DFFA30D}" type="datetimeFigureOut">
               <a:rPr lang="en-US" smtClean="0"/>
-              <a:t>11-Oct-15</a:t>
+              <a:t>14-Oct-15</a:t>
             </a:fld>
             <a:endParaRPr lang="en-US"/>
           </a:p>
@@ -1227,7 +1229,7 @@
           <a:p>
             <a:fld id="{D728701E-CAF4-4159-9B3E-41C86DFFA30D}" type="datetimeFigureOut">
               <a:rPr lang="en-US" smtClean="0"/>
-              <a:t>11-Oct-15</a:t>
+              <a:t>14-Oct-15</a:t>
             </a:fld>
             <a:endParaRPr lang="en-US"/>
           </a:p>
@@ -1770,7 +1772,7 @@
           <a:p>
             <a:fld id="{D728701E-CAF4-4159-9B3E-41C86DFFA30D}" type="datetimeFigureOut">
               <a:rPr lang="en-US" smtClean="0"/>
-              <a:t>11-Oct-15</a:t>
+              <a:t>14-Oct-15</a:t>
             </a:fld>
             <a:endParaRPr lang="en-US"/>
           </a:p>
@@ -1906,7 +1908,7 @@
           <a:p>
             <a:fld id="{D728701E-CAF4-4159-9B3E-41C86DFFA30D}" type="datetimeFigureOut">
               <a:rPr lang="en-US" smtClean="0"/>
-              <a:t>11-Oct-15</a:t>
+              <a:t>14-Oct-15</a:t>
             </a:fld>
             <a:endParaRPr lang="en-US"/>
           </a:p>
@@ -2244,7 +2246,7 @@
           <a:p>
             <a:fld id="{D728701E-CAF4-4159-9B3E-41C86DFFA30D}" type="datetimeFigureOut">
               <a:rPr lang="en-US" smtClean="0"/>
-              <a:t>11-Oct-15</a:t>
+              <a:t>14-Oct-15</a:t>
             </a:fld>
             <a:endParaRPr lang="en-US"/>
           </a:p>
@@ -2570,7 +2572,7 @@
           <a:p>
             <a:fld id="{D728701E-CAF4-4159-9B3E-41C86DFFA30D}" type="datetimeFigureOut">
               <a:rPr lang="en-US" smtClean="0"/>
-              <a:t>11-Oct-15</a:t>
+              <a:t>14-Oct-15</a:t>
             </a:fld>
             <a:endParaRPr lang="en-US"/>
           </a:p>
@@ -2868,7 +2870,7 @@
           <a:p>
             <a:fld id="{D728701E-CAF4-4159-9B3E-41C86DFFA30D}" type="datetimeFigureOut">
               <a:rPr lang="en-US" smtClean="0"/>
-              <a:t>11-Oct-15</a:t>
+              <a:t>14-Oct-15</a:t>
             </a:fld>
             <a:endParaRPr lang="en-US"/>
           </a:p>
@@ -3255,7 +3257,7 @@
           <a:p>
             <a:fld id="{D728701E-CAF4-4159-9B3E-41C86DFFA30D}" type="datetimeFigureOut">
               <a:rPr lang="en-US" smtClean="0"/>
-              <a:t>11-Oct-15</a:t>
+              <a:t>14-Oct-15</a:t>
             </a:fld>
             <a:endParaRPr lang="en-US"/>
           </a:p>
@@ -3675,7 +3677,7 @@
           <a:p>
             <a:fld id="{D728701E-CAF4-4159-9B3E-41C86DFFA30D}" type="datetimeFigureOut">
               <a:rPr lang="en-US" smtClean="0"/>
-              <a:t>11-Oct-15</a:t>
+              <a:t>14-Oct-15</a:t>
             </a:fld>
             <a:endParaRPr lang="en-US"/>
           </a:p>
@@ -4223,7 +4225,7 @@
           <a:p>
             <a:fld id="{D728701E-CAF4-4159-9B3E-41C86DFFA30D}" type="datetimeFigureOut">
               <a:rPr lang="en-US" smtClean="0"/>
-              <a:t>11-Oct-15</a:t>
+              <a:t>14-Oct-15</a:t>
             </a:fld>
             <a:endParaRPr lang="en-US"/>
           </a:p>
@@ -4581,7 +4583,7 @@
           <a:p>
             <a:fld id="{D728701E-CAF4-4159-9B3E-41C86DFFA30D}" type="datetimeFigureOut">
               <a:rPr lang="en-US" smtClean="0"/>
-              <a:t>11-Oct-15</a:t>
+              <a:t>14-Oct-15</a:t>
             </a:fld>
             <a:endParaRPr lang="en-US"/>
           </a:p>
@@ -4796,7 +4798,7 @@
           <a:p>
             <a:fld id="{D728701E-CAF4-4159-9B3E-41C86DFFA30D}" type="datetimeFigureOut">
               <a:rPr lang="en-US" smtClean="0"/>
-              <a:t>11-Oct-15</a:t>
+              <a:t>14-Oct-15</a:t>
             </a:fld>
             <a:endParaRPr lang="en-US"/>
           </a:p>
@@ -5103,7 +5105,7 @@
           <a:p>
             <a:fld id="{D728701E-CAF4-4159-9B3E-41C86DFFA30D}" type="datetimeFigureOut">
               <a:rPr lang="en-US" smtClean="0"/>
-              <a:t>11-Oct-15</a:t>
+              <a:t>14-Oct-15</a:t>
             </a:fld>
             <a:endParaRPr lang="en-US"/>
           </a:p>
@@ -5359,7 +5361,7 @@
           <a:p>
             <a:fld id="{D728701E-CAF4-4159-9B3E-41C86DFFA30D}" type="datetimeFigureOut">
               <a:rPr lang="en-US" smtClean="0"/>
-              <a:t>11-Oct-15</a:t>
+              <a:t>14-Oct-15</a:t>
             </a:fld>
             <a:endParaRPr lang="en-US"/>
           </a:p>
@@ -5748,7 +5750,7 @@
           <a:p>
             <a:fld id="{D728701E-CAF4-4159-9B3E-41C86DFFA30D}" type="datetimeFigureOut">
               <a:rPr lang="en-US" smtClean="0"/>
-              <a:t>11-Oct-15</a:t>
+              <a:t>14-Oct-15</a:t>
             </a:fld>
             <a:endParaRPr lang="en-US"/>
           </a:p>
@@ -6337,7 +6339,7 @@
           <a:p>
             <a:fld id="{D728701E-CAF4-4159-9B3E-41C86DFFA30D}" type="datetimeFigureOut">
               <a:rPr lang="en-US" smtClean="0"/>
-              <a:t>11-Oct-15</a:t>
+              <a:t>14-Oct-15</a:t>
             </a:fld>
             <a:endParaRPr lang="en-US"/>
           </a:p>
@@ -6852,7 +6854,7 @@
           <a:p>
             <a:fld id="{D728701E-CAF4-4159-9B3E-41C86DFFA30D}" type="datetimeFigureOut">
               <a:rPr lang="en-US" smtClean="0"/>
-              <a:t>11-Oct-15</a:t>
+              <a:t>14-Oct-15</a:t>
             </a:fld>
             <a:endParaRPr lang="en-US"/>
           </a:p>
@@ -7225,7 +7227,7 @@
           <a:p>
             <a:fld id="{D728701E-CAF4-4159-9B3E-41C86DFFA30D}" type="datetimeFigureOut">
               <a:rPr lang="en-US" smtClean="0"/>
-              <a:t>11-Oct-15</a:t>
+              <a:t>14-Oct-15</a:t>
             </a:fld>
             <a:endParaRPr lang="en-US"/>
           </a:p>
@@ -7624,7 +7626,7 @@
           <a:p>
             <a:fld id="{D728701E-CAF4-4159-9B3E-41C86DFFA30D}" type="datetimeFigureOut">
               <a:rPr lang="en-US" smtClean="0"/>
-              <a:t>11-Oct-15</a:t>
+              <a:t>14-Oct-15</a:t>
             </a:fld>
             <a:endParaRPr lang="en-US"/>
           </a:p>
@@ -8044,7 +8046,7 @@
           <a:p>
             <a:fld id="{D728701E-CAF4-4159-9B3E-41C86DFFA30D}" type="datetimeFigureOut">
               <a:rPr lang="en-US" smtClean="0"/>
-              <a:t>11-Oct-15</a:t>
+              <a:t>14-Oct-15</a:t>
             </a:fld>
             <a:endParaRPr lang="en-US"/>
           </a:p>
@@ -8427,7 +8429,7 @@
           <a:p>
             <a:fld id="{D728701E-CAF4-4159-9B3E-41C86DFFA30D}" type="datetimeFigureOut">
               <a:rPr lang="en-US" smtClean="0"/>
-              <a:t>11-Oct-15</a:t>
+              <a:t>14-Oct-15</a:t>
             </a:fld>
             <a:endParaRPr lang="en-US"/>
           </a:p>
@@ -9116,146 +9118,294 @@
       </p:grpSpPr>
       <p:sp>
         <p:nvSpPr>
-          <p:cNvPr id="2" name="Título 1"/>
-          <p:cNvSpPr>
-            <a:spLocks noGrp="1"/>
-          </p:cNvSpPr>
-          <p:nvPr>
-            <p:ph type="ctrTitle"/>
-          </p:nvPr>
-        </p:nvSpPr>
-        <p:spPr>
-          <a:xfrm>
-            <a:off x="4271211" y="4824663"/>
-            <a:ext cx="4588627" cy="1455821"/>
-          </a:xfrm>
-        </p:spPr>
-        <p:txBody>
-          <a:bodyPr>
-            <a:noAutofit/>
-          </a:bodyPr>
-          <a:lstStyle/>
-          <a:p>
-            <a:r>
-              <a:rPr lang="pt-PT" sz="3200" dirty="0"/>
-              <a:t>Materiais das sondas </a:t>
-            </a:r>
-            <a:r>
-              <a:rPr lang="pt-PT" sz="3200" dirty="0" smtClean="0"/>
-              <a:t>para a professora</a:t>
-            </a:r>
-            <a:endParaRPr lang="pt-PT" sz="3200" dirty="0"/>
-          </a:p>
-        </p:txBody>
-      </p:sp>
-      <p:sp>
-        <p:nvSpPr>
-          <p:cNvPr id="6" name="Marcador de Posição do Texto 5"/>
-          <p:cNvSpPr>
-            <a:spLocks noGrp="1"/>
-          </p:cNvSpPr>
-          <p:nvPr>
-            <p:ph type="body" sz="half" idx="2"/>
-          </p:nvPr>
-        </p:nvSpPr>
-        <p:spPr>
-          <a:xfrm>
-            <a:off x="312820" y="839016"/>
-            <a:ext cx="4199021" cy="2918031"/>
-          </a:xfrm>
-        </p:spPr>
+          <p:cNvPr id="2" name="Title 1"/>
+          <p:cNvSpPr>
+            <a:spLocks noGrp="1"/>
+          </p:cNvSpPr>
+          <p:nvPr>
+            <p:ph type="title"/>
+          </p:nvPr>
+        </p:nvSpPr>
+        <p:spPr/>
         <p:txBody>
           <a:bodyPr/>
           <a:lstStyle/>
           <a:p>
-            <a:endParaRPr lang="pt-PT" sz="4000" dirty="0" smtClean="0"/>
-          </a:p>
-          <a:p>
-            <a:r>
-              <a:rPr lang="pt-PT" sz="4000" dirty="0" smtClean="0"/>
-              <a:t>Sonda para a professora de idosos</a:t>
-            </a:r>
-            <a:endParaRPr lang="pt-PT" sz="4000" dirty="0"/>
-          </a:p>
-        </p:txBody>
-      </p:sp>
-      <p:pic>
-        <p:nvPicPr>
-          <p:cNvPr id="8" name="Imagem 7"/>
-          <p:cNvPicPr>
-            <a:picLocks noChangeAspect="1"/>
-          </p:cNvPicPr>
+            <a:r>
+              <a:rPr lang="pt-PT" dirty="0"/>
+              <a:t>Sonda para a </a:t>
+            </a:r>
+            <a:r>
+              <a:rPr lang="pt-PT" dirty="0" smtClean="0"/>
+              <a:t>funcionária		2/2</a:t>
+            </a:r>
+            <a:endParaRPr lang="pt-PT" dirty="0"/>
+          </a:p>
+        </p:txBody>
+      </p:sp>
+      <p:sp>
+        <p:nvSpPr>
+          <p:cNvPr id="5" name="Subtitle 2"/>
+          <p:cNvSpPr txBox="1">
+            <a:spLocks/>
+          </p:cNvSpPr>
           <p:nvPr/>
-        </p:nvPicPr>
-        <p:blipFill>
-          <a:blip r:embed="rId2">
-            <a:duotone>
-              <a:schemeClr val="accent6">
-                <a:shade val="45000"/>
-                <a:satMod val="135000"/>
-              </a:schemeClr>
-              <a:prstClr val="white"/>
-            </a:duotone>
-          </a:blip>
-          <a:stretch>
-            <a:fillRect/>
-          </a:stretch>
-        </p:blipFill>
-        <p:spPr>
-          <a:xfrm>
-            <a:off x="4695288" y="333473"/>
-            <a:ext cx="1954456" cy="1514564"/>
+        </p:nvSpPr>
+        <p:spPr>
+          <a:xfrm>
+            <a:off x="498473" y="1142999"/>
+            <a:ext cx="7556313" cy="838201"/>
           </a:xfrm>
           <a:prstGeom prst="rect">
             <a:avLst/>
           </a:prstGeom>
         </p:spPr>
-      </p:pic>
-      <p:pic>
-        <p:nvPicPr>
-          <p:cNvPr id="7" name="Picture 2" descr="C:\Program Files (x86)\Microsoft Office\MEDIA\CAGCAT10\j0217698.wmf"/>
-          <p:cNvPicPr>
-            <a:picLocks noChangeAspect="1" noChangeArrowheads="1"/>
-          </p:cNvPicPr>
-          <p:nvPr/>
-        </p:nvPicPr>
-        <p:blipFill>
-          <a:blip r:embed="rId3" cstate="email">
-            <a:extLst>
-              <a:ext uri="{28A0092B-C50C-407E-A947-70E740481C1C}">
-                <a14:useLocalDpi xmlns:a14="http://schemas.microsoft.com/office/drawing/2010/main" val="0"/>
-              </a:ext>
-            </a:extLst>
-          </a:blip>
-          <a:srcRect/>
-          <a:stretch>
-            <a:fillRect/>
-          </a:stretch>
-        </p:blipFill>
-        <p:spPr bwMode="auto">
-          <a:xfrm>
-            <a:off x="7037409" y="2604842"/>
-            <a:ext cx="1747418" cy="1693469"/>
-          </a:xfrm>
-          <a:prstGeom prst="rect">
-            <a:avLst/>
-          </a:prstGeom>
-          <a:noFill/>
-          <a:extLst>
-            <a:ext uri="{909E8E84-426E-40DD-AFC4-6F175D3DCCD1}">
-              <a14:hiddenFill xmlns:a14="http://schemas.microsoft.com/office/drawing/2010/main">
-                <a:solidFill>
-                  <a:srgbClr val="FFFFFF"/>
-                </a:solidFill>
-              </a14:hiddenFill>
-            </a:ext>
-          </a:extLst>
-        </p:spPr>
-      </p:pic>
+        <p:txBody>
+          <a:bodyPr vert="horz" lIns="91440" tIns="45720" rIns="91440" bIns="45720" rtlCol="0">
+            <a:normAutofit/>
+          </a:bodyPr>
+          <a:lstStyle>
+            <a:lvl1pPr marL="228600" indent="-228600" algn="l" defTabSz="914400" rtl="0" eaLnBrk="1" latinLnBrk="0" hangingPunct="1">
+              <a:spcBef>
+                <a:spcPts val="2000"/>
+              </a:spcBef>
+              <a:buClr>
+                <a:schemeClr val="accent1"/>
+              </a:buClr>
+              <a:buSzPct val="75000"/>
+              <a:buFont typeface="Wingdings" pitchFamily="2" charset="2"/>
+              <a:buChar char="n"/>
+              <a:defRPr sz="2000" kern="1200">
+                <a:solidFill>
+                  <a:schemeClr val="tx1">
+                    <a:lumMod val="65000"/>
+                    <a:lumOff val="35000"/>
+                  </a:schemeClr>
+                </a:solidFill>
+                <a:latin typeface="+mn-lt"/>
+                <a:ea typeface="+mn-ea"/>
+                <a:cs typeface="+mn-cs"/>
+              </a:defRPr>
+            </a:lvl1pPr>
+            <a:lvl2pPr marL="457200" indent="-228600" algn="l" defTabSz="914400" rtl="0" eaLnBrk="1" latinLnBrk="0" hangingPunct="1">
+              <a:spcBef>
+                <a:spcPts val="600"/>
+              </a:spcBef>
+              <a:buClr>
+                <a:schemeClr val="accent1">
+                  <a:lumMod val="60000"/>
+                  <a:lumOff val="40000"/>
+                </a:schemeClr>
+              </a:buClr>
+              <a:buSzPct val="75000"/>
+              <a:buFont typeface="Wingdings" pitchFamily="2" charset="2"/>
+              <a:buChar char="n"/>
+              <a:defRPr sz="1800" kern="1200">
+                <a:solidFill>
+                  <a:schemeClr val="tx1">
+                    <a:lumMod val="65000"/>
+                    <a:lumOff val="35000"/>
+                  </a:schemeClr>
+                </a:solidFill>
+                <a:latin typeface="+mn-lt"/>
+                <a:ea typeface="+mn-ea"/>
+                <a:cs typeface="+mn-cs"/>
+              </a:defRPr>
+            </a:lvl2pPr>
+            <a:lvl3pPr marL="685800" indent="-228600" algn="l" defTabSz="914400" rtl="0" eaLnBrk="1" latinLnBrk="0" hangingPunct="1">
+              <a:spcBef>
+                <a:spcPts val="600"/>
+              </a:spcBef>
+              <a:buClr>
+                <a:schemeClr val="accent1"/>
+              </a:buClr>
+              <a:buSzPct val="75000"/>
+              <a:buFont typeface="Wingdings" pitchFamily="2" charset="2"/>
+              <a:buChar char="n"/>
+              <a:defRPr sz="1800" kern="1200">
+                <a:solidFill>
+                  <a:schemeClr val="tx1">
+                    <a:lumMod val="65000"/>
+                    <a:lumOff val="35000"/>
+                  </a:schemeClr>
+                </a:solidFill>
+                <a:latin typeface="+mn-lt"/>
+                <a:ea typeface="+mn-ea"/>
+                <a:cs typeface="+mn-cs"/>
+              </a:defRPr>
+            </a:lvl3pPr>
+            <a:lvl4pPr marL="914400" indent="-228600" algn="l" defTabSz="914400" rtl="0" eaLnBrk="1" latinLnBrk="0" hangingPunct="1">
+              <a:spcBef>
+                <a:spcPts val="600"/>
+              </a:spcBef>
+              <a:buClr>
+                <a:schemeClr val="accent1">
+                  <a:lumMod val="60000"/>
+                  <a:lumOff val="40000"/>
+                </a:schemeClr>
+              </a:buClr>
+              <a:buSzPct val="75000"/>
+              <a:buFont typeface="Wingdings" pitchFamily="2" charset="2"/>
+              <a:buChar char="n"/>
+              <a:defRPr sz="1800" kern="1200">
+                <a:solidFill>
+                  <a:schemeClr val="tx1">
+                    <a:lumMod val="65000"/>
+                    <a:lumOff val="35000"/>
+                  </a:schemeClr>
+                </a:solidFill>
+                <a:latin typeface="+mn-lt"/>
+                <a:ea typeface="+mn-ea"/>
+                <a:cs typeface="+mn-cs"/>
+              </a:defRPr>
+            </a:lvl4pPr>
+            <a:lvl5pPr marL="1143000" indent="-228600" algn="l" defTabSz="914400" rtl="0" eaLnBrk="1" latinLnBrk="0" hangingPunct="1">
+              <a:spcBef>
+                <a:spcPts val="600"/>
+              </a:spcBef>
+              <a:buClr>
+                <a:schemeClr val="accent1"/>
+              </a:buClr>
+              <a:buSzPct val="75000"/>
+              <a:buFont typeface="Wingdings" pitchFamily="2" charset="2"/>
+              <a:buChar char="n"/>
+              <a:defRPr sz="1800" kern="1200">
+                <a:solidFill>
+                  <a:schemeClr val="tx1">
+                    <a:lumMod val="65000"/>
+                    <a:lumOff val="35000"/>
+                  </a:schemeClr>
+                </a:solidFill>
+                <a:latin typeface="+mn-lt"/>
+                <a:ea typeface="+mn-ea"/>
+                <a:cs typeface="+mn-cs"/>
+              </a:defRPr>
+            </a:lvl5pPr>
+            <a:lvl6pPr marL="1377950" indent="-228600" algn="l" defTabSz="914400" rtl="0" eaLnBrk="1" latinLnBrk="0" hangingPunct="1">
+              <a:spcBef>
+                <a:spcPct val="20000"/>
+              </a:spcBef>
+              <a:buClr>
+                <a:schemeClr val="accent1">
+                  <a:lumMod val="60000"/>
+                  <a:lumOff val="40000"/>
+                </a:schemeClr>
+              </a:buClr>
+              <a:buSzPct val="75000"/>
+              <a:buFont typeface="Wingdings" pitchFamily="2" charset="2"/>
+              <a:buChar char=""/>
+              <a:defRPr lang="en-US" sz="1800" kern="1200" dirty="0" smtClean="0">
+                <a:solidFill>
+                  <a:schemeClr val="tx1">
+                    <a:lumMod val="65000"/>
+                    <a:lumOff val="35000"/>
+                  </a:schemeClr>
+                </a:solidFill>
+                <a:latin typeface="+mn-lt"/>
+                <a:ea typeface="+mn-ea"/>
+                <a:cs typeface="+mn-cs"/>
+              </a:defRPr>
+            </a:lvl6pPr>
+            <a:lvl7pPr marL="1603375" indent="-228600" algn="l" defTabSz="914400" rtl="0" eaLnBrk="1" latinLnBrk="0" hangingPunct="1">
+              <a:spcBef>
+                <a:spcPct val="20000"/>
+              </a:spcBef>
+              <a:buClr>
+                <a:schemeClr val="accent1"/>
+              </a:buClr>
+              <a:buSzPct val="75000"/>
+              <a:buFont typeface="Wingdings" pitchFamily="2" charset="2"/>
+              <a:buChar char=""/>
+              <a:defRPr lang="en-US" sz="1800" kern="1200" baseline="0" dirty="0" smtClean="0">
+                <a:solidFill>
+                  <a:schemeClr val="tx1">
+                    <a:lumMod val="65000"/>
+                    <a:lumOff val="35000"/>
+                  </a:schemeClr>
+                </a:solidFill>
+                <a:latin typeface="+mn-lt"/>
+                <a:ea typeface="+mn-ea"/>
+                <a:cs typeface="+mn-cs"/>
+              </a:defRPr>
+            </a:lvl7pPr>
+            <a:lvl8pPr marL="1830388" indent="-228600" algn="l" defTabSz="914400" rtl="0" eaLnBrk="1" latinLnBrk="0" hangingPunct="1">
+              <a:spcBef>
+                <a:spcPct val="20000"/>
+              </a:spcBef>
+              <a:buClr>
+                <a:schemeClr val="accent1">
+                  <a:lumMod val="60000"/>
+                  <a:lumOff val="40000"/>
+                </a:schemeClr>
+              </a:buClr>
+              <a:buSzPct val="75000"/>
+              <a:buFont typeface="Wingdings" pitchFamily="2" charset="2"/>
+              <a:buChar char=""/>
+              <a:defRPr lang="en-US" sz="1800" kern="1200" baseline="0" dirty="0" smtClean="0">
+                <a:solidFill>
+                  <a:schemeClr val="tx1">
+                    <a:lumMod val="65000"/>
+                    <a:lumOff val="35000"/>
+                  </a:schemeClr>
+                </a:solidFill>
+                <a:latin typeface="+mn-lt"/>
+                <a:ea typeface="+mn-ea"/>
+                <a:cs typeface="+mn-cs"/>
+              </a:defRPr>
+            </a:lvl8pPr>
+            <a:lvl9pPr marL="2057400" indent="-228600" algn="l" defTabSz="914400" rtl="0" eaLnBrk="1" latinLnBrk="0" hangingPunct="1">
+              <a:spcBef>
+                <a:spcPct val="20000"/>
+              </a:spcBef>
+              <a:buClr>
+                <a:schemeClr val="accent1"/>
+              </a:buClr>
+              <a:buSzPct val="75000"/>
+              <a:buFont typeface="Wingdings" pitchFamily="2" charset="2"/>
+              <a:buChar char=""/>
+              <a:defRPr lang="en-US" sz="1800" kern="1200" baseline="0" dirty="0">
+                <a:solidFill>
+                  <a:schemeClr val="tx1">
+                    <a:lumMod val="65000"/>
+                    <a:lumOff val="35000"/>
+                  </a:schemeClr>
+                </a:solidFill>
+                <a:latin typeface="+mn-lt"/>
+                <a:ea typeface="+mn-ea"/>
+                <a:cs typeface="+mn-cs"/>
+              </a:defRPr>
+            </a:lvl9pPr>
+          </a:lstStyle>
+          <a:p>
+            <a:pPr marL="0" indent="0">
+              <a:buNone/>
+            </a:pPr>
+            <a:r>
+              <a:rPr lang="pt-PT" sz="2400" dirty="0" smtClean="0">
+                <a:solidFill>
+                  <a:schemeClr val="bg1">
+                    <a:lumMod val="65000"/>
+                  </a:schemeClr>
+                </a:solidFill>
+                <a:latin typeface="+mj-lt"/>
+              </a:rPr>
+              <a:t>Tarefas</a:t>
+            </a:r>
+            <a:endParaRPr lang="pt-PT" sz="2400" dirty="0">
+              <a:solidFill>
+                <a:schemeClr val="bg1">
+                  <a:lumMod val="65000"/>
+                </a:schemeClr>
+              </a:solidFill>
+              <a:latin typeface="+mj-lt"/>
+            </a:endParaRPr>
+          </a:p>
+        </p:txBody>
+      </p:sp>
     </p:spTree>
     <p:extLst>
       <p:ext uri="{BB962C8B-B14F-4D97-AF65-F5344CB8AC3E}">
-        <p14:creationId xmlns:p14="http://schemas.microsoft.com/office/powerpoint/2010/main" val="299810385"/>
+        <p14:creationId xmlns:p14="http://schemas.microsoft.com/office/powerpoint/2010/main" val="1541820160"/>
       </p:ext>
     </p:extLst>
   </p:cSld>
@@ -9291,300 +9441,111 @@
       </p:grpSpPr>
       <p:sp>
         <p:nvSpPr>
-          <p:cNvPr id="2" name="Title 1"/>
-          <p:cNvSpPr>
-            <a:spLocks noGrp="1"/>
-          </p:cNvSpPr>
-          <p:nvPr>
-            <p:ph type="title"/>
-          </p:nvPr>
-        </p:nvSpPr>
-        <p:spPr/>
+          <p:cNvPr id="2" name="Título 1"/>
+          <p:cNvSpPr>
+            <a:spLocks noGrp="1"/>
+          </p:cNvSpPr>
+          <p:nvPr>
+            <p:ph type="ctrTitle"/>
+          </p:nvPr>
+        </p:nvSpPr>
+        <p:spPr>
+          <a:xfrm>
+            <a:off x="4271211" y="4824663"/>
+            <a:ext cx="4588627" cy="1455821"/>
+          </a:xfrm>
+        </p:spPr>
+        <p:txBody>
+          <a:bodyPr>
+            <a:noAutofit/>
+          </a:bodyPr>
+          <a:lstStyle/>
+          <a:p>
+            <a:r>
+              <a:rPr lang="pt-PT" sz="3200" dirty="0"/>
+              <a:t>Materiais das sondas </a:t>
+            </a:r>
+            <a:r>
+              <a:rPr lang="pt-PT" sz="3200" dirty="0" smtClean="0"/>
+              <a:t>para a professora</a:t>
+            </a:r>
+            <a:endParaRPr lang="pt-PT" sz="3200" dirty="0"/>
+          </a:p>
+        </p:txBody>
+      </p:sp>
+      <p:sp>
+        <p:nvSpPr>
+          <p:cNvPr id="6" name="Marcador de Posição do Texto 5"/>
+          <p:cNvSpPr>
+            <a:spLocks noGrp="1"/>
+          </p:cNvSpPr>
+          <p:nvPr>
+            <p:ph type="body" sz="half" idx="2"/>
+          </p:nvPr>
+        </p:nvSpPr>
+        <p:spPr>
+          <a:xfrm>
+            <a:off x="312820" y="839016"/>
+            <a:ext cx="4199021" cy="2918031"/>
+          </a:xfrm>
+        </p:spPr>
         <p:txBody>
           <a:bodyPr/>
           <a:lstStyle/>
           <a:p>
-            <a:r>
-              <a:rPr lang="pt-PT" dirty="0"/>
-              <a:t>Sonda para a </a:t>
-            </a:r>
-            <a:r>
-              <a:rPr lang="pt-PT" dirty="0" smtClean="0"/>
-              <a:t>professora		1/2</a:t>
-            </a:r>
-            <a:endParaRPr lang="pt-PT" dirty="0"/>
-          </a:p>
-        </p:txBody>
-      </p:sp>
-      <p:sp>
-        <p:nvSpPr>
-          <p:cNvPr id="5" name="Subtitle 2"/>
-          <p:cNvSpPr txBox="1">
-            <a:spLocks/>
-          </p:cNvSpPr>
+            <a:endParaRPr lang="pt-PT" sz="4000" dirty="0" smtClean="0"/>
+          </a:p>
+          <a:p>
+            <a:r>
+              <a:rPr lang="pt-PT" sz="4000" dirty="0" smtClean="0"/>
+              <a:t>Sonda para a professora de idosos</a:t>
+            </a:r>
+            <a:endParaRPr lang="pt-PT" sz="4000" dirty="0"/>
+          </a:p>
+        </p:txBody>
+      </p:sp>
+      <p:pic>
+        <p:nvPicPr>
+          <p:cNvPr id="8" name="Imagem 7"/>
+          <p:cNvPicPr>
+            <a:picLocks noChangeAspect="1"/>
+          </p:cNvPicPr>
           <p:nvPr/>
-        </p:nvSpPr>
-        <p:spPr>
-          <a:xfrm>
-            <a:off x="498473" y="1142999"/>
-            <a:ext cx="7556313" cy="838201"/>
+        </p:nvPicPr>
+        <p:blipFill>
+          <a:blip r:embed="rId2">
+            <a:duotone>
+              <a:schemeClr val="accent6">
+                <a:shade val="45000"/>
+                <a:satMod val="135000"/>
+              </a:schemeClr>
+              <a:prstClr val="white"/>
+            </a:duotone>
+          </a:blip>
+          <a:stretch>
+            <a:fillRect/>
+          </a:stretch>
+        </p:blipFill>
+        <p:spPr>
+          <a:xfrm>
+            <a:off x="4695288" y="333473"/>
+            <a:ext cx="1954456" cy="1514564"/>
           </a:xfrm>
           <a:prstGeom prst="rect">
             <a:avLst/>
           </a:prstGeom>
         </p:spPr>
-        <p:txBody>
-          <a:bodyPr vert="horz" lIns="91440" tIns="45720" rIns="91440" bIns="45720" rtlCol="0">
-            <a:normAutofit/>
-          </a:bodyPr>
-          <a:lstStyle>
-            <a:lvl1pPr marL="228600" indent="-228600" algn="l" defTabSz="914400" rtl="0" eaLnBrk="1" latinLnBrk="0" hangingPunct="1">
-              <a:spcBef>
-                <a:spcPts val="2000"/>
-              </a:spcBef>
-              <a:buClr>
-                <a:schemeClr val="accent1"/>
-              </a:buClr>
-              <a:buSzPct val="75000"/>
-              <a:buFont typeface="Wingdings" pitchFamily="2" charset="2"/>
-              <a:buChar char="n"/>
-              <a:defRPr sz="2000" kern="1200">
-                <a:solidFill>
-                  <a:schemeClr val="tx1">
-                    <a:lumMod val="65000"/>
-                    <a:lumOff val="35000"/>
-                  </a:schemeClr>
-                </a:solidFill>
-                <a:latin typeface="+mn-lt"/>
-                <a:ea typeface="+mn-ea"/>
-                <a:cs typeface="+mn-cs"/>
-              </a:defRPr>
-            </a:lvl1pPr>
-            <a:lvl2pPr marL="457200" indent="-228600" algn="l" defTabSz="914400" rtl="0" eaLnBrk="1" latinLnBrk="0" hangingPunct="1">
-              <a:spcBef>
-                <a:spcPts val="600"/>
-              </a:spcBef>
-              <a:buClr>
-                <a:schemeClr val="accent1">
-                  <a:lumMod val="60000"/>
-                  <a:lumOff val="40000"/>
-                </a:schemeClr>
-              </a:buClr>
-              <a:buSzPct val="75000"/>
-              <a:buFont typeface="Wingdings" pitchFamily="2" charset="2"/>
-              <a:buChar char="n"/>
-              <a:defRPr sz="1800" kern="1200">
-                <a:solidFill>
-                  <a:schemeClr val="tx1">
-                    <a:lumMod val="65000"/>
-                    <a:lumOff val="35000"/>
-                  </a:schemeClr>
-                </a:solidFill>
-                <a:latin typeface="+mn-lt"/>
-                <a:ea typeface="+mn-ea"/>
-                <a:cs typeface="+mn-cs"/>
-              </a:defRPr>
-            </a:lvl2pPr>
-            <a:lvl3pPr marL="685800" indent="-228600" algn="l" defTabSz="914400" rtl="0" eaLnBrk="1" latinLnBrk="0" hangingPunct="1">
-              <a:spcBef>
-                <a:spcPts val="600"/>
-              </a:spcBef>
-              <a:buClr>
-                <a:schemeClr val="accent1"/>
-              </a:buClr>
-              <a:buSzPct val="75000"/>
-              <a:buFont typeface="Wingdings" pitchFamily="2" charset="2"/>
-              <a:buChar char="n"/>
-              <a:defRPr sz="1800" kern="1200">
-                <a:solidFill>
-                  <a:schemeClr val="tx1">
-                    <a:lumMod val="65000"/>
-                    <a:lumOff val="35000"/>
-                  </a:schemeClr>
-                </a:solidFill>
-                <a:latin typeface="+mn-lt"/>
-                <a:ea typeface="+mn-ea"/>
-                <a:cs typeface="+mn-cs"/>
-              </a:defRPr>
-            </a:lvl3pPr>
-            <a:lvl4pPr marL="914400" indent="-228600" algn="l" defTabSz="914400" rtl="0" eaLnBrk="1" latinLnBrk="0" hangingPunct="1">
-              <a:spcBef>
-                <a:spcPts val="600"/>
-              </a:spcBef>
-              <a:buClr>
-                <a:schemeClr val="accent1">
-                  <a:lumMod val="60000"/>
-                  <a:lumOff val="40000"/>
-                </a:schemeClr>
-              </a:buClr>
-              <a:buSzPct val="75000"/>
-              <a:buFont typeface="Wingdings" pitchFamily="2" charset="2"/>
-              <a:buChar char="n"/>
-              <a:defRPr sz="1800" kern="1200">
-                <a:solidFill>
-                  <a:schemeClr val="tx1">
-                    <a:lumMod val="65000"/>
-                    <a:lumOff val="35000"/>
-                  </a:schemeClr>
-                </a:solidFill>
-                <a:latin typeface="+mn-lt"/>
-                <a:ea typeface="+mn-ea"/>
-                <a:cs typeface="+mn-cs"/>
-              </a:defRPr>
-            </a:lvl4pPr>
-            <a:lvl5pPr marL="1143000" indent="-228600" algn="l" defTabSz="914400" rtl="0" eaLnBrk="1" latinLnBrk="0" hangingPunct="1">
-              <a:spcBef>
-                <a:spcPts val="600"/>
-              </a:spcBef>
-              <a:buClr>
-                <a:schemeClr val="accent1"/>
-              </a:buClr>
-              <a:buSzPct val="75000"/>
-              <a:buFont typeface="Wingdings" pitchFamily="2" charset="2"/>
-              <a:buChar char="n"/>
-              <a:defRPr sz="1800" kern="1200">
-                <a:solidFill>
-                  <a:schemeClr val="tx1">
-                    <a:lumMod val="65000"/>
-                    <a:lumOff val="35000"/>
-                  </a:schemeClr>
-                </a:solidFill>
-                <a:latin typeface="+mn-lt"/>
-                <a:ea typeface="+mn-ea"/>
-                <a:cs typeface="+mn-cs"/>
-              </a:defRPr>
-            </a:lvl5pPr>
-            <a:lvl6pPr marL="1377950" indent="-228600" algn="l" defTabSz="914400" rtl="0" eaLnBrk="1" latinLnBrk="0" hangingPunct="1">
-              <a:spcBef>
-                <a:spcPct val="20000"/>
-              </a:spcBef>
-              <a:buClr>
-                <a:schemeClr val="accent1">
-                  <a:lumMod val="60000"/>
-                  <a:lumOff val="40000"/>
-                </a:schemeClr>
-              </a:buClr>
-              <a:buSzPct val="75000"/>
-              <a:buFont typeface="Wingdings" pitchFamily="2" charset="2"/>
-              <a:buChar char=""/>
-              <a:defRPr lang="en-US" sz="1800" kern="1200" dirty="0" smtClean="0">
-                <a:solidFill>
-                  <a:schemeClr val="tx1">
-                    <a:lumMod val="65000"/>
-                    <a:lumOff val="35000"/>
-                  </a:schemeClr>
-                </a:solidFill>
-                <a:latin typeface="+mn-lt"/>
-                <a:ea typeface="+mn-ea"/>
-                <a:cs typeface="+mn-cs"/>
-              </a:defRPr>
-            </a:lvl6pPr>
-            <a:lvl7pPr marL="1603375" indent="-228600" algn="l" defTabSz="914400" rtl="0" eaLnBrk="1" latinLnBrk="0" hangingPunct="1">
-              <a:spcBef>
-                <a:spcPct val="20000"/>
-              </a:spcBef>
-              <a:buClr>
-                <a:schemeClr val="accent1"/>
-              </a:buClr>
-              <a:buSzPct val="75000"/>
-              <a:buFont typeface="Wingdings" pitchFamily="2" charset="2"/>
-              <a:buChar char=""/>
-              <a:defRPr lang="en-US" sz="1800" kern="1200" baseline="0" dirty="0" smtClean="0">
-                <a:solidFill>
-                  <a:schemeClr val="tx1">
-                    <a:lumMod val="65000"/>
-                    <a:lumOff val="35000"/>
-                  </a:schemeClr>
-                </a:solidFill>
-                <a:latin typeface="+mn-lt"/>
-                <a:ea typeface="+mn-ea"/>
-                <a:cs typeface="+mn-cs"/>
-              </a:defRPr>
-            </a:lvl7pPr>
-            <a:lvl8pPr marL="1830388" indent="-228600" algn="l" defTabSz="914400" rtl="0" eaLnBrk="1" latinLnBrk="0" hangingPunct="1">
-              <a:spcBef>
-                <a:spcPct val="20000"/>
-              </a:spcBef>
-              <a:buClr>
-                <a:schemeClr val="accent1">
-                  <a:lumMod val="60000"/>
-                  <a:lumOff val="40000"/>
-                </a:schemeClr>
-              </a:buClr>
-              <a:buSzPct val="75000"/>
-              <a:buFont typeface="Wingdings" pitchFamily="2" charset="2"/>
-              <a:buChar char=""/>
-              <a:defRPr lang="en-US" sz="1800" kern="1200" baseline="0" dirty="0" smtClean="0">
-                <a:solidFill>
-                  <a:schemeClr val="tx1">
-                    <a:lumMod val="65000"/>
-                    <a:lumOff val="35000"/>
-                  </a:schemeClr>
-                </a:solidFill>
-                <a:latin typeface="+mn-lt"/>
-                <a:ea typeface="+mn-ea"/>
-                <a:cs typeface="+mn-cs"/>
-              </a:defRPr>
-            </a:lvl8pPr>
-            <a:lvl9pPr marL="2057400" indent="-228600" algn="l" defTabSz="914400" rtl="0" eaLnBrk="1" latinLnBrk="0" hangingPunct="1">
-              <a:spcBef>
-                <a:spcPct val="20000"/>
-              </a:spcBef>
-              <a:buClr>
-                <a:schemeClr val="accent1"/>
-              </a:buClr>
-              <a:buSzPct val="75000"/>
-              <a:buFont typeface="Wingdings" pitchFamily="2" charset="2"/>
-              <a:buChar char=""/>
-              <a:defRPr lang="en-US" sz="1800" kern="1200" baseline="0" dirty="0">
-                <a:solidFill>
-                  <a:schemeClr val="tx1">
-                    <a:lumMod val="65000"/>
-                    <a:lumOff val="35000"/>
-                  </a:schemeClr>
-                </a:solidFill>
-                <a:latin typeface="+mn-lt"/>
-                <a:ea typeface="+mn-ea"/>
-                <a:cs typeface="+mn-cs"/>
-              </a:defRPr>
-            </a:lvl9pPr>
-          </a:lstStyle>
-          <a:p>
-            <a:pPr marL="0" indent="0">
-              <a:buNone/>
-            </a:pPr>
-            <a:r>
-              <a:rPr lang="pt-PT" sz="2400" dirty="0" smtClean="0">
-                <a:solidFill>
-                  <a:schemeClr val="bg1">
-                    <a:lumMod val="65000"/>
-                  </a:schemeClr>
-                </a:solidFill>
-                <a:latin typeface="+mj-lt"/>
-              </a:rPr>
-              <a:t>Saco</a:t>
-            </a:r>
-            <a:endParaRPr lang="pt-PT" sz="2400" dirty="0">
-              <a:solidFill>
-                <a:schemeClr val="bg1">
-                  <a:lumMod val="65000"/>
-                </a:schemeClr>
-              </a:solidFill>
-              <a:latin typeface="+mj-lt"/>
-            </a:endParaRPr>
-          </a:p>
-        </p:txBody>
-      </p:sp>
+      </p:pic>
       <p:pic>
         <p:nvPicPr>
-          <p:cNvPr id="2052" name="Picture 4" descr="https://scontent-lhr3-1.xx.fbcdn.net/hphotos-xpa1/v/t34.0-12/12080937_10203829614341310_495570546_n.jpg?oh=0d05d17b9a7d6231d5897a9cf39ed465&amp;oe=561C367F"/>
+          <p:cNvPr id="7" name="Picture 2" descr="C:\Program Files (x86)\Microsoft Office\MEDIA\CAGCAT10\j0217698.wmf"/>
           <p:cNvPicPr>
             <a:picLocks noChangeAspect="1" noChangeArrowheads="1"/>
           </p:cNvPicPr>
           <p:nvPr/>
         </p:nvPicPr>
         <p:blipFill>
-          <a:blip r:embed="rId2" cstate="email">
+          <a:blip r:embed="rId3" cstate="email">
             <a:extLst>
               <a:ext uri="{28A0092B-C50C-407E-A947-70E740481C1C}">
                 <a14:useLocalDpi xmlns:a14="http://schemas.microsoft.com/office/drawing/2010/main" val="0"/>
@@ -9598,8 +9559,8 @@
         </p:blipFill>
         <p:spPr bwMode="auto">
           <a:xfrm>
-            <a:off x="498474" y="1981199"/>
-            <a:ext cx="3292091" cy="4389455"/>
+            <a:off x="7037409" y="2604842"/>
+            <a:ext cx="1747418" cy="1693469"/>
           </a:xfrm>
           <a:prstGeom prst="rect">
             <a:avLst/>
@@ -9619,7 +9580,7 @@
     </p:spTree>
     <p:extLst>
       <p:ext uri="{BB962C8B-B14F-4D97-AF65-F5344CB8AC3E}">
-        <p14:creationId xmlns:p14="http://schemas.microsoft.com/office/powerpoint/2010/main" val="554498631"/>
+        <p14:creationId xmlns:p14="http://schemas.microsoft.com/office/powerpoint/2010/main" val="299810385"/>
       </p:ext>
     </p:extLst>
   </p:cSld>
@@ -9655,6 +9616,693 @@
       </p:grpSpPr>
       <p:sp>
         <p:nvSpPr>
+          <p:cNvPr id="2" name="Title 1"/>
+          <p:cNvSpPr>
+            <a:spLocks noGrp="1"/>
+          </p:cNvSpPr>
+          <p:nvPr>
+            <p:ph type="title"/>
+          </p:nvPr>
+        </p:nvSpPr>
+        <p:spPr/>
+        <p:txBody>
+          <a:bodyPr/>
+          <a:lstStyle/>
+          <a:p>
+            <a:r>
+              <a:rPr lang="pt-PT" dirty="0"/>
+              <a:t>Sonda para a </a:t>
+            </a:r>
+            <a:r>
+              <a:rPr lang="pt-PT" dirty="0" smtClean="0"/>
+              <a:t>professora		1/2</a:t>
+            </a:r>
+            <a:endParaRPr lang="pt-PT" dirty="0"/>
+          </a:p>
+        </p:txBody>
+      </p:sp>
+      <p:sp>
+        <p:nvSpPr>
+          <p:cNvPr id="5" name="Subtitle 2"/>
+          <p:cNvSpPr txBox="1">
+            <a:spLocks/>
+          </p:cNvSpPr>
+          <p:nvPr/>
+        </p:nvSpPr>
+        <p:spPr>
+          <a:xfrm>
+            <a:off x="498473" y="1142999"/>
+            <a:ext cx="7556313" cy="838201"/>
+          </a:xfrm>
+          <a:prstGeom prst="rect">
+            <a:avLst/>
+          </a:prstGeom>
+        </p:spPr>
+        <p:txBody>
+          <a:bodyPr vert="horz" lIns="91440" tIns="45720" rIns="91440" bIns="45720" rtlCol="0">
+            <a:normAutofit/>
+          </a:bodyPr>
+          <a:lstStyle>
+            <a:lvl1pPr marL="228600" indent="-228600" algn="l" defTabSz="914400" rtl="0" eaLnBrk="1" latinLnBrk="0" hangingPunct="1">
+              <a:spcBef>
+                <a:spcPts val="2000"/>
+              </a:spcBef>
+              <a:buClr>
+                <a:schemeClr val="accent1"/>
+              </a:buClr>
+              <a:buSzPct val="75000"/>
+              <a:buFont typeface="Wingdings" pitchFamily="2" charset="2"/>
+              <a:buChar char="n"/>
+              <a:defRPr sz="2000" kern="1200">
+                <a:solidFill>
+                  <a:schemeClr val="tx1">
+                    <a:lumMod val="65000"/>
+                    <a:lumOff val="35000"/>
+                  </a:schemeClr>
+                </a:solidFill>
+                <a:latin typeface="+mn-lt"/>
+                <a:ea typeface="+mn-ea"/>
+                <a:cs typeface="+mn-cs"/>
+              </a:defRPr>
+            </a:lvl1pPr>
+            <a:lvl2pPr marL="457200" indent="-228600" algn="l" defTabSz="914400" rtl="0" eaLnBrk="1" latinLnBrk="0" hangingPunct="1">
+              <a:spcBef>
+                <a:spcPts val="600"/>
+              </a:spcBef>
+              <a:buClr>
+                <a:schemeClr val="accent1">
+                  <a:lumMod val="60000"/>
+                  <a:lumOff val="40000"/>
+                </a:schemeClr>
+              </a:buClr>
+              <a:buSzPct val="75000"/>
+              <a:buFont typeface="Wingdings" pitchFamily="2" charset="2"/>
+              <a:buChar char="n"/>
+              <a:defRPr sz="1800" kern="1200">
+                <a:solidFill>
+                  <a:schemeClr val="tx1">
+                    <a:lumMod val="65000"/>
+                    <a:lumOff val="35000"/>
+                  </a:schemeClr>
+                </a:solidFill>
+                <a:latin typeface="+mn-lt"/>
+                <a:ea typeface="+mn-ea"/>
+                <a:cs typeface="+mn-cs"/>
+              </a:defRPr>
+            </a:lvl2pPr>
+            <a:lvl3pPr marL="685800" indent="-228600" algn="l" defTabSz="914400" rtl="0" eaLnBrk="1" latinLnBrk="0" hangingPunct="1">
+              <a:spcBef>
+                <a:spcPts val="600"/>
+              </a:spcBef>
+              <a:buClr>
+                <a:schemeClr val="accent1"/>
+              </a:buClr>
+              <a:buSzPct val="75000"/>
+              <a:buFont typeface="Wingdings" pitchFamily="2" charset="2"/>
+              <a:buChar char="n"/>
+              <a:defRPr sz="1800" kern="1200">
+                <a:solidFill>
+                  <a:schemeClr val="tx1">
+                    <a:lumMod val="65000"/>
+                    <a:lumOff val="35000"/>
+                  </a:schemeClr>
+                </a:solidFill>
+                <a:latin typeface="+mn-lt"/>
+                <a:ea typeface="+mn-ea"/>
+                <a:cs typeface="+mn-cs"/>
+              </a:defRPr>
+            </a:lvl3pPr>
+            <a:lvl4pPr marL="914400" indent="-228600" algn="l" defTabSz="914400" rtl="0" eaLnBrk="1" latinLnBrk="0" hangingPunct="1">
+              <a:spcBef>
+                <a:spcPts val="600"/>
+              </a:spcBef>
+              <a:buClr>
+                <a:schemeClr val="accent1">
+                  <a:lumMod val="60000"/>
+                  <a:lumOff val="40000"/>
+                </a:schemeClr>
+              </a:buClr>
+              <a:buSzPct val="75000"/>
+              <a:buFont typeface="Wingdings" pitchFamily="2" charset="2"/>
+              <a:buChar char="n"/>
+              <a:defRPr sz="1800" kern="1200">
+                <a:solidFill>
+                  <a:schemeClr val="tx1">
+                    <a:lumMod val="65000"/>
+                    <a:lumOff val="35000"/>
+                  </a:schemeClr>
+                </a:solidFill>
+                <a:latin typeface="+mn-lt"/>
+                <a:ea typeface="+mn-ea"/>
+                <a:cs typeface="+mn-cs"/>
+              </a:defRPr>
+            </a:lvl4pPr>
+            <a:lvl5pPr marL="1143000" indent="-228600" algn="l" defTabSz="914400" rtl="0" eaLnBrk="1" latinLnBrk="0" hangingPunct="1">
+              <a:spcBef>
+                <a:spcPts val="600"/>
+              </a:spcBef>
+              <a:buClr>
+                <a:schemeClr val="accent1"/>
+              </a:buClr>
+              <a:buSzPct val="75000"/>
+              <a:buFont typeface="Wingdings" pitchFamily="2" charset="2"/>
+              <a:buChar char="n"/>
+              <a:defRPr sz="1800" kern="1200">
+                <a:solidFill>
+                  <a:schemeClr val="tx1">
+                    <a:lumMod val="65000"/>
+                    <a:lumOff val="35000"/>
+                  </a:schemeClr>
+                </a:solidFill>
+                <a:latin typeface="+mn-lt"/>
+                <a:ea typeface="+mn-ea"/>
+                <a:cs typeface="+mn-cs"/>
+              </a:defRPr>
+            </a:lvl5pPr>
+            <a:lvl6pPr marL="1377950" indent="-228600" algn="l" defTabSz="914400" rtl="0" eaLnBrk="1" latinLnBrk="0" hangingPunct="1">
+              <a:spcBef>
+                <a:spcPct val="20000"/>
+              </a:spcBef>
+              <a:buClr>
+                <a:schemeClr val="accent1">
+                  <a:lumMod val="60000"/>
+                  <a:lumOff val="40000"/>
+                </a:schemeClr>
+              </a:buClr>
+              <a:buSzPct val="75000"/>
+              <a:buFont typeface="Wingdings" pitchFamily="2" charset="2"/>
+              <a:buChar char=""/>
+              <a:defRPr lang="en-US" sz="1800" kern="1200" dirty="0" smtClean="0">
+                <a:solidFill>
+                  <a:schemeClr val="tx1">
+                    <a:lumMod val="65000"/>
+                    <a:lumOff val="35000"/>
+                  </a:schemeClr>
+                </a:solidFill>
+                <a:latin typeface="+mn-lt"/>
+                <a:ea typeface="+mn-ea"/>
+                <a:cs typeface="+mn-cs"/>
+              </a:defRPr>
+            </a:lvl6pPr>
+            <a:lvl7pPr marL="1603375" indent="-228600" algn="l" defTabSz="914400" rtl="0" eaLnBrk="1" latinLnBrk="0" hangingPunct="1">
+              <a:spcBef>
+                <a:spcPct val="20000"/>
+              </a:spcBef>
+              <a:buClr>
+                <a:schemeClr val="accent1"/>
+              </a:buClr>
+              <a:buSzPct val="75000"/>
+              <a:buFont typeface="Wingdings" pitchFamily="2" charset="2"/>
+              <a:buChar char=""/>
+              <a:defRPr lang="en-US" sz="1800" kern="1200" baseline="0" dirty="0" smtClean="0">
+                <a:solidFill>
+                  <a:schemeClr val="tx1">
+                    <a:lumMod val="65000"/>
+                    <a:lumOff val="35000"/>
+                  </a:schemeClr>
+                </a:solidFill>
+                <a:latin typeface="+mn-lt"/>
+                <a:ea typeface="+mn-ea"/>
+                <a:cs typeface="+mn-cs"/>
+              </a:defRPr>
+            </a:lvl7pPr>
+            <a:lvl8pPr marL="1830388" indent="-228600" algn="l" defTabSz="914400" rtl="0" eaLnBrk="1" latinLnBrk="0" hangingPunct="1">
+              <a:spcBef>
+                <a:spcPct val="20000"/>
+              </a:spcBef>
+              <a:buClr>
+                <a:schemeClr val="accent1">
+                  <a:lumMod val="60000"/>
+                  <a:lumOff val="40000"/>
+                </a:schemeClr>
+              </a:buClr>
+              <a:buSzPct val="75000"/>
+              <a:buFont typeface="Wingdings" pitchFamily="2" charset="2"/>
+              <a:buChar char=""/>
+              <a:defRPr lang="en-US" sz="1800" kern="1200" baseline="0" dirty="0" smtClean="0">
+                <a:solidFill>
+                  <a:schemeClr val="tx1">
+                    <a:lumMod val="65000"/>
+                    <a:lumOff val="35000"/>
+                  </a:schemeClr>
+                </a:solidFill>
+                <a:latin typeface="+mn-lt"/>
+                <a:ea typeface="+mn-ea"/>
+                <a:cs typeface="+mn-cs"/>
+              </a:defRPr>
+            </a:lvl8pPr>
+            <a:lvl9pPr marL="2057400" indent="-228600" algn="l" defTabSz="914400" rtl="0" eaLnBrk="1" latinLnBrk="0" hangingPunct="1">
+              <a:spcBef>
+                <a:spcPct val="20000"/>
+              </a:spcBef>
+              <a:buClr>
+                <a:schemeClr val="accent1"/>
+              </a:buClr>
+              <a:buSzPct val="75000"/>
+              <a:buFont typeface="Wingdings" pitchFamily="2" charset="2"/>
+              <a:buChar char=""/>
+              <a:defRPr lang="en-US" sz="1800" kern="1200" baseline="0" dirty="0">
+                <a:solidFill>
+                  <a:schemeClr val="tx1">
+                    <a:lumMod val="65000"/>
+                    <a:lumOff val="35000"/>
+                  </a:schemeClr>
+                </a:solidFill>
+                <a:latin typeface="+mn-lt"/>
+                <a:ea typeface="+mn-ea"/>
+                <a:cs typeface="+mn-cs"/>
+              </a:defRPr>
+            </a:lvl9pPr>
+          </a:lstStyle>
+          <a:p>
+            <a:pPr marL="0" indent="0">
+              <a:buNone/>
+            </a:pPr>
+            <a:r>
+              <a:rPr lang="pt-PT" sz="2400" dirty="0" smtClean="0">
+                <a:solidFill>
+                  <a:schemeClr val="bg1">
+                    <a:lumMod val="65000"/>
+                  </a:schemeClr>
+                </a:solidFill>
+                <a:latin typeface="+mj-lt"/>
+              </a:rPr>
+              <a:t>Saco específico</a:t>
+            </a:r>
+            <a:endParaRPr lang="pt-PT" sz="2400" dirty="0">
+              <a:solidFill>
+                <a:schemeClr val="bg1">
+                  <a:lumMod val="65000"/>
+                </a:schemeClr>
+              </a:solidFill>
+              <a:latin typeface="+mj-lt"/>
+            </a:endParaRPr>
+          </a:p>
+        </p:txBody>
+      </p:sp>
+      <p:pic>
+        <p:nvPicPr>
+          <p:cNvPr id="2052" name="Picture 4" descr="https://scontent-lhr3-1.xx.fbcdn.net/hphotos-xpa1/v/t34.0-12/12080937_10203829614341310_495570546_n.jpg?oh=0d05d17b9a7d6231d5897a9cf39ed465&amp;oe=561C367F"/>
+          <p:cNvPicPr>
+            <a:picLocks noChangeAspect="1" noChangeArrowheads="1"/>
+          </p:cNvPicPr>
+          <p:nvPr/>
+        </p:nvPicPr>
+        <p:blipFill>
+          <a:blip r:embed="rId2" cstate="email">
+            <a:extLst>
+              <a:ext uri="{28A0092B-C50C-407E-A947-70E740481C1C}">
+                <a14:useLocalDpi xmlns:a14="http://schemas.microsoft.com/office/drawing/2010/main" val="0"/>
+              </a:ext>
+            </a:extLst>
+          </a:blip>
+          <a:srcRect/>
+          <a:stretch>
+            <a:fillRect/>
+          </a:stretch>
+        </p:blipFill>
+        <p:spPr bwMode="auto">
+          <a:xfrm>
+            <a:off x="498474" y="1981199"/>
+            <a:ext cx="3292091" cy="4389455"/>
+          </a:xfrm>
+          <a:prstGeom prst="rect">
+            <a:avLst/>
+          </a:prstGeom>
+          <a:noFill/>
+          <a:extLst>
+            <a:ext uri="{909E8E84-426E-40DD-AFC4-6F175D3DCCD1}">
+              <a14:hiddenFill xmlns:a14="http://schemas.microsoft.com/office/drawing/2010/main">
+                <a:solidFill>
+                  <a:srgbClr val="FFFFFF"/>
+                </a:solidFill>
+              </a14:hiddenFill>
+            </a:ext>
+          </a:extLst>
+        </p:spPr>
+      </p:pic>
+    </p:spTree>
+    <p:extLst>
+      <p:ext uri="{BB962C8B-B14F-4D97-AF65-F5344CB8AC3E}">
+        <p14:creationId xmlns:p14="http://schemas.microsoft.com/office/powerpoint/2010/main" val="554498631"/>
+      </p:ext>
+    </p:extLst>
+  </p:cSld>
+  <p:clrMapOvr>
+    <a:masterClrMapping/>
+  </p:clrMapOvr>
+  <p:timing>
+    <p:tnLst>
+      <p:par>
+        <p:cTn id="1" dur="indefinite" restart="never" nodeType="tmRoot"/>
+      </p:par>
+    </p:tnLst>
+  </p:timing>
+</p:sld>
+</file>
+
+<file path=ppt/slides/slide13.xml><?xml version="1.0" encoding="utf-8"?>
+<p:sld xmlns:a="http://schemas.openxmlformats.org/drawingml/2006/main" xmlns:r="http://schemas.openxmlformats.org/officeDocument/2006/relationships" xmlns:p="http://schemas.openxmlformats.org/presentationml/2006/main">
+  <p:cSld>
+    <p:spTree>
+      <p:nvGrpSpPr>
+        <p:cNvPr id="1" name=""/>
+        <p:cNvGrpSpPr/>
+        <p:nvPr/>
+      </p:nvGrpSpPr>
+      <p:grpSpPr>
+        <a:xfrm>
+          <a:off x="0" y="0"/>
+          <a:ext cx="0" cy="0"/>
+          <a:chOff x="0" y="0"/>
+          <a:chExt cx="0" cy="0"/>
+        </a:xfrm>
+      </p:grpSpPr>
+      <p:sp>
+        <p:nvSpPr>
+          <p:cNvPr id="2" name="Title 1"/>
+          <p:cNvSpPr>
+            <a:spLocks noGrp="1"/>
+          </p:cNvSpPr>
+          <p:nvPr>
+            <p:ph type="title"/>
+          </p:nvPr>
+        </p:nvSpPr>
+        <p:spPr/>
+        <p:txBody>
+          <a:bodyPr/>
+          <a:lstStyle/>
+          <a:p>
+            <a:r>
+              <a:rPr lang="pt-PT" dirty="0"/>
+              <a:t>Sonda para a </a:t>
+            </a:r>
+            <a:r>
+              <a:rPr lang="pt-PT" dirty="0" smtClean="0"/>
+              <a:t>professora		2/2</a:t>
+            </a:r>
+            <a:endParaRPr lang="pt-PT" dirty="0"/>
+          </a:p>
+        </p:txBody>
+      </p:sp>
+      <p:sp>
+        <p:nvSpPr>
+          <p:cNvPr id="5" name="Subtitle 2"/>
+          <p:cNvSpPr txBox="1">
+            <a:spLocks/>
+          </p:cNvSpPr>
+          <p:nvPr/>
+        </p:nvSpPr>
+        <p:spPr>
+          <a:xfrm>
+            <a:off x="498473" y="1142999"/>
+            <a:ext cx="7556313" cy="838201"/>
+          </a:xfrm>
+          <a:prstGeom prst="rect">
+            <a:avLst/>
+          </a:prstGeom>
+        </p:spPr>
+        <p:txBody>
+          <a:bodyPr vert="horz" lIns="91440" tIns="45720" rIns="91440" bIns="45720" rtlCol="0">
+            <a:normAutofit/>
+          </a:bodyPr>
+          <a:lstStyle>
+            <a:lvl1pPr marL="228600" indent="-228600" algn="l" defTabSz="914400" rtl="0" eaLnBrk="1" latinLnBrk="0" hangingPunct="1">
+              <a:spcBef>
+                <a:spcPts val="2000"/>
+              </a:spcBef>
+              <a:buClr>
+                <a:schemeClr val="accent1"/>
+              </a:buClr>
+              <a:buSzPct val="75000"/>
+              <a:buFont typeface="Wingdings" pitchFamily="2" charset="2"/>
+              <a:buChar char="n"/>
+              <a:defRPr sz="2000" kern="1200">
+                <a:solidFill>
+                  <a:schemeClr val="tx1">
+                    <a:lumMod val="65000"/>
+                    <a:lumOff val="35000"/>
+                  </a:schemeClr>
+                </a:solidFill>
+                <a:latin typeface="+mn-lt"/>
+                <a:ea typeface="+mn-ea"/>
+                <a:cs typeface="+mn-cs"/>
+              </a:defRPr>
+            </a:lvl1pPr>
+            <a:lvl2pPr marL="457200" indent="-228600" algn="l" defTabSz="914400" rtl="0" eaLnBrk="1" latinLnBrk="0" hangingPunct="1">
+              <a:spcBef>
+                <a:spcPts val="600"/>
+              </a:spcBef>
+              <a:buClr>
+                <a:schemeClr val="accent1">
+                  <a:lumMod val="60000"/>
+                  <a:lumOff val="40000"/>
+                </a:schemeClr>
+              </a:buClr>
+              <a:buSzPct val="75000"/>
+              <a:buFont typeface="Wingdings" pitchFamily="2" charset="2"/>
+              <a:buChar char="n"/>
+              <a:defRPr sz="1800" kern="1200">
+                <a:solidFill>
+                  <a:schemeClr val="tx1">
+                    <a:lumMod val="65000"/>
+                    <a:lumOff val="35000"/>
+                  </a:schemeClr>
+                </a:solidFill>
+                <a:latin typeface="+mn-lt"/>
+                <a:ea typeface="+mn-ea"/>
+                <a:cs typeface="+mn-cs"/>
+              </a:defRPr>
+            </a:lvl2pPr>
+            <a:lvl3pPr marL="685800" indent="-228600" algn="l" defTabSz="914400" rtl="0" eaLnBrk="1" latinLnBrk="0" hangingPunct="1">
+              <a:spcBef>
+                <a:spcPts val="600"/>
+              </a:spcBef>
+              <a:buClr>
+                <a:schemeClr val="accent1"/>
+              </a:buClr>
+              <a:buSzPct val="75000"/>
+              <a:buFont typeface="Wingdings" pitchFamily="2" charset="2"/>
+              <a:buChar char="n"/>
+              <a:defRPr sz="1800" kern="1200">
+                <a:solidFill>
+                  <a:schemeClr val="tx1">
+                    <a:lumMod val="65000"/>
+                    <a:lumOff val="35000"/>
+                  </a:schemeClr>
+                </a:solidFill>
+                <a:latin typeface="+mn-lt"/>
+                <a:ea typeface="+mn-ea"/>
+                <a:cs typeface="+mn-cs"/>
+              </a:defRPr>
+            </a:lvl3pPr>
+            <a:lvl4pPr marL="914400" indent="-228600" algn="l" defTabSz="914400" rtl="0" eaLnBrk="1" latinLnBrk="0" hangingPunct="1">
+              <a:spcBef>
+                <a:spcPts val="600"/>
+              </a:spcBef>
+              <a:buClr>
+                <a:schemeClr val="accent1">
+                  <a:lumMod val="60000"/>
+                  <a:lumOff val="40000"/>
+                </a:schemeClr>
+              </a:buClr>
+              <a:buSzPct val="75000"/>
+              <a:buFont typeface="Wingdings" pitchFamily="2" charset="2"/>
+              <a:buChar char="n"/>
+              <a:defRPr sz="1800" kern="1200">
+                <a:solidFill>
+                  <a:schemeClr val="tx1">
+                    <a:lumMod val="65000"/>
+                    <a:lumOff val="35000"/>
+                  </a:schemeClr>
+                </a:solidFill>
+                <a:latin typeface="+mn-lt"/>
+                <a:ea typeface="+mn-ea"/>
+                <a:cs typeface="+mn-cs"/>
+              </a:defRPr>
+            </a:lvl4pPr>
+            <a:lvl5pPr marL="1143000" indent="-228600" algn="l" defTabSz="914400" rtl="0" eaLnBrk="1" latinLnBrk="0" hangingPunct="1">
+              <a:spcBef>
+                <a:spcPts val="600"/>
+              </a:spcBef>
+              <a:buClr>
+                <a:schemeClr val="accent1"/>
+              </a:buClr>
+              <a:buSzPct val="75000"/>
+              <a:buFont typeface="Wingdings" pitchFamily="2" charset="2"/>
+              <a:buChar char="n"/>
+              <a:defRPr sz="1800" kern="1200">
+                <a:solidFill>
+                  <a:schemeClr val="tx1">
+                    <a:lumMod val="65000"/>
+                    <a:lumOff val="35000"/>
+                  </a:schemeClr>
+                </a:solidFill>
+                <a:latin typeface="+mn-lt"/>
+                <a:ea typeface="+mn-ea"/>
+                <a:cs typeface="+mn-cs"/>
+              </a:defRPr>
+            </a:lvl5pPr>
+            <a:lvl6pPr marL="1377950" indent="-228600" algn="l" defTabSz="914400" rtl="0" eaLnBrk="1" latinLnBrk="0" hangingPunct="1">
+              <a:spcBef>
+                <a:spcPct val="20000"/>
+              </a:spcBef>
+              <a:buClr>
+                <a:schemeClr val="accent1">
+                  <a:lumMod val="60000"/>
+                  <a:lumOff val="40000"/>
+                </a:schemeClr>
+              </a:buClr>
+              <a:buSzPct val="75000"/>
+              <a:buFont typeface="Wingdings" pitchFamily="2" charset="2"/>
+              <a:buChar char=""/>
+              <a:defRPr lang="en-US" sz="1800" kern="1200" dirty="0" smtClean="0">
+                <a:solidFill>
+                  <a:schemeClr val="tx1">
+                    <a:lumMod val="65000"/>
+                    <a:lumOff val="35000"/>
+                  </a:schemeClr>
+                </a:solidFill>
+                <a:latin typeface="+mn-lt"/>
+                <a:ea typeface="+mn-ea"/>
+                <a:cs typeface="+mn-cs"/>
+              </a:defRPr>
+            </a:lvl6pPr>
+            <a:lvl7pPr marL="1603375" indent="-228600" algn="l" defTabSz="914400" rtl="0" eaLnBrk="1" latinLnBrk="0" hangingPunct="1">
+              <a:spcBef>
+                <a:spcPct val="20000"/>
+              </a:spcBef>
+              <a:buClr>
+                <a:schemeClr val="accent1"/>
+              </a:buClr>
+              <a:buSzPct val="75000"/>
+              <a:buFont typeface="Wingdings" pitchFamily="2" charset="2"/>
+              <a:buChar char=""/>
+              <a:defRPr lang="en-US" sz="1800" kern="1200" baseline="0" dirty="0" smtClean="0">
+                <a:solidFill>
+                  <a:schemeClr val="tx1">
+                    <a:lumMod val="65000"/>
+                    <a:lumOff val="35000"/>
+                  </a:schemeClr>
+                </a:solidFill>
+                <a:latin typeface="+mn-lt"/>
+                <a:ea typeface="+mn-ea"/>
+                <a:cs typeface="+mn-cs"/>
+              </a:defRPr>
+            </a:lvl7pPr>
+            <a:lvl8pPr marL="1830388" indent="-228600" algn="l" defTabSz="914400" rtl="0" eaLnBrk="1" latinLnBrk="0" hangingPunct="1">
+              <a:spcBef>
+                <a:spcPct val="20000"/>
+              </a:spcBef>
+              <a:buClr>
+                <a:schemeClr val="accent1">
+                  <a:lumMod val="60000"/>
+                  <a:lumOff val="40000"/>
+                </a:schemeClr>
+              </a:buClr>
+              <a:buSzPct val="75000"/>
+              <a:buFont typeface="Wingdings" pitchFamily="2" charset="2"/>
+              <a:buChar char=""/>
+              <a:defRPr lang="en-US" sz="1800" kern="1200" baseline="0" dirty="0" smtClean="0">
+                <a:solidFill>
+                  <a:schemeClr val="tx1">
+                    <a:lumMod val="65000"/>
+                    <a:lumOff val="35000"/>
+                  </a:schemeClr>
+                </a:solidFill>
+                <a:latin typeface="+mn-lt"/>
+                <a:ea typeface="+mn-ea"/>
+                <a:cs typeface="+mn-cs"/>
+              </a:defRPr>
+            </a:lvl8pPr>
+            <a:lvl9pPr marL="2057400" indent="-228600" algn="l" defTabSz="914400" rtl="0" eaLnBrk="1" latinLnBrk="0" hangingPunct="1">
+              <a:spcBef>
+                <a:spcPct val="20000"/>
+              </a:spcBef>
+              <a:buClr>
+                <a:schemeClr val="accent1"/>
+              </a:buClr>
+              <a:buSzPct val="75000"/>
+              <a:buFont typeface="Wingdings" pitchFamily="2" charset="2"/>
+              <a:buChar char=""/>
+              <a:defRPr lang="en-US" sz="1800" kern="1200" baseline="0" dirty="0">
+                <a:solidFill>
+                  <a:schemeClr val="tx1">
+                    <a:lumMod val="65000"/>
+                    <a:lumOff val="35000"/>
+                  </a:schemeClr>
+                </a:solidFill>
+                <a:latin typeface="+mn-lt"/>
+                <a:ea typeface="+mn-ea"/>
+                <a:cs typeface="+mn-cs"/>
+              </a:defRPr>
+            </a:lvl9pPr>
+          </a:lstStyle>
+          <a:p>
+            <a:pPr marL="0" indent="0">
+              <a:buNone/>
+            </a:pPr>
+            <a:r>
+              <a:rPr lang="pt-PT" sz="2400" dirty="0" smtClean="0">
+                <a:solidFill>
+                  <a:schemeClr val="bg1">
+                    <a:lumMod val="65000"/>
+                  </a:schemeClr>
+                </a:solidFill>
+                <a:latin typeface="+mj-lt"/>
+              </a:rPr>
+              <a:t>Tarefas</a:t>
+            </a:r>
+            <a:endParaRPr lang="pt-PT" sz="2400" dirty="0">
+              <a:solidFill>
+                <a:schemeClr val="bg1">
+                  <a:lumMod val="65000"/>
+                </a:schemeClr>
+              </a:solidFill>
+              <a:latin typeface="+mj-lt"/>
+            </a:endParaRPr>
+          </a:p>
+        </p:txBody>
+      </p:sp>
+    </p:spTree>
+    <p:extLst>
+      <p:ext uri="{BB962C8B-B14F-4D97-AF65-F5344CB8AC3E}">
+        <p14:creationId xmlns:p14="http://schemas.microsoft.com/office/powerpoint/2010/main" val="638303478"/>
+      </p:ext>
+    </p:extLst>
+  </p:cSld>
+  <p:clrMapOvr>
+    <a:masterClrMapping/>
+  </p:clrMapOvr>
+  <p:timing>
+    <p:tnLst>
+      <p:par>
+        <p:cTn id="1" dur="indefinite" restart="never" nodeType="tmRoot"/>
+      </p:par>
+    </p:tnLst>
+  </p:timing>
+</p:sld>
+</file>
+
+<file path=ppt/slides/slide14.xml><?xml version="1.0" encoding="utf-8"?>
+<p:sld xmlns:a="http://schemas.openxmlformats.org/drawingml/2006/main" xmlns:r="http://schemas.openxmlformats.org/officeDocument/2006/relationships" xmlns:p="http://schemas.openxmlformats.org/presentationml/2006/main">
+  <p:cSld>
+    <p:spTree>
+      <p:nvGrpSpPr>
+        <p:cNvPr id="1" name=""/>
+        <p:cNvGrpSpPr/>
+        <p:nvPr/>
+      </p:nvGrpSpPr>
+      <p:grpSpPr>
+        <a:xfrm>
+          <a:off x="0" y="0"/>
+          <a:ext cx="0" cy="0"/>
+          <a:chOff x="0" y="0"/>
+          <a:chExt cx="0" cy="0"/>
+        </a:xfrm>
+      </p:grpSpPr>
+      <p:sp>
+        <p:nvSpPr>
           <p:cNvPr id="2" name="Título 1"/>
           <p:cNvSpPr>
             <a:spLocks noGrp="1"/>
@@ -9780,7 +10428,7 @@
 </p:sld>
 </file>
 
-<file path=ppt/slides/slide13.xml><?xml version="1.0" encoding="utf-8"?>
+<file path=ppt/slides/slide15.xml><?xml version="1.0" encoding="utf-8"?>
 <p:sld xmlns:a="http://schemas.openxmlformats.org/drawingml/2006/main" xmlns:r="http://schemas.openxmlformats.org/officeDocument/2006/relationships" xmlns:p="http://schemas.openxmlformats.org/presentationml/2006/main">
   <p:cSld>
     <p:spTree>
@@ -12293,7 +12941,7 @@
             </a:r>
             <a:r>
               <a:rPr lang="pt-PT" dirty="0" smtClean="0"/>
-              <a:t>funcionária		1/2</a:t>
+              <a:t>funcionária</a:t>
             </a:r>
             <a:endParaRPr lang="pt-PT" dirty="0"/>
           </a:p>
@@ -12545,7 +13193,7 @@
                 </a:solidFill>
                 <a:latin typeface="+mj-lt"/>
               </a:rPr>
-              <a:t>Saco</a:t>
+              <a:t>Saco específico</a:t>
             </a:r>
             <a:endParaRPr lang="pt-PT" sz="2400" dirty="0">
               <a:solidFill>
@@ -13140,7 +13788,7 @@
   <a:extraClrSchemeLst/>
   <a:extLst>
     <a:ext uri="{05A4C25C-085E-4340-85A3-A5531E510DB2}">
-      <thm15:themeFamily xmlns="" xmlns:thm15="http://schemas.microsoft.com/office/thememl/2012/main" name="Office Theme" id="{62F939B6-93AF-4DB8-9C6B-D6C7DFDC589F}" vid="{4A3C46E8-61CC-4603-A589-7422A47A8E4A}"/>
+      <thm15:themeFamily xmlns:thm15="http://schemas.microsoft.com/office/thememl/2012/main" xmlns="" name="Office Theme" id="{62F939B6-93AF-4DB8-9C6B-D6C7DFDC589F}" vid="{4A3C46E8-61CC-4603-A589-7422A47A8E4A}"/>
     </a:ext>
   </a:extLst>
 </a:theme>

</xml_diff>